<commit_message>
start work on sdlc section
</commit_message>
<xml_diff>
--- a/Step1-Model_presentation.pptx
+++ b/Step1-Model_presentation.pptx
@@ -5,21 +5,23 @@
     <p:sldMasterId id="2147483660" r:id="rId1"/>
   </p:sldMasterIdLst>
   <p:notesMasterIdLst>
-    <p:notesMasterId r:id="rId14"/>
+    <p:notesMasterId r:id="rId16"/>
   </p:notesMasterIdLst>
   <p:sldIdLst>
     <p:sldId id="256" r:id="rId2"/>
-    <p:sldId id="257" r:id="rId3"/>
-    <p:sldId id="258" r:id="rId4"/>
-    <p:sldId id="259" r:id="rId5"/>
-    <p:sldId id="260" r:id="rId6"/>
-    <p:sldId id="261" r:id="rId7"/>
-    <p:sldId id="262" r:id="rId8"/>
-    <p:sldId id="263" r:id="rId9"/>
-    <p:sldId id="264" r:id="rId10"/>
-    <p:sldId id="265" r:id="rId11"/>
-    <p:sldId id="266" r:id="rId12"/>
-    <p:sldId id="267" r:id="rId13"/>
+    <p:sldId id="268" r:id="rId3"/>
+    <p:sldId id="269" r:id="rId4"/>
+    <p:sldId id="257" r:id="rId5"/>
+    <p:sldId id="258" r:id="rId6"/>
+    <p:sldId id="259" r:id="rId7"/>
+    <p:sldId id="260" r:id="rId8"/>
+    <p:sldId id="261" r:id="rId9"/>
+    <p:sldId id="262" r:id="rId10"/>
+    <p:sldId id="263" r:id="rId11"/>
+    <p:sldId id="264" r:id="rId12"/>
+    <p:sldId id="265" r:id="rId13"/>
+    <p:sldId id="266" r:id="rId14"/>
+    <p:sldId id="267" r:id="rId15"/>
   </p:sldIdLst>
   <p:sldSz cx="12192000" cy="6858000"/>
   <p:notesSz cx="6858000" cy="9144000"/>
@@ -522,7 +524,7 @@
           <a:p>
             <a:fld id="{14FB1113-EC1E-4052-ADC3-711A8186C8F9}" type="datetimeFigureOut">
               <a:rPr lang="ru-UA" smtClean="0"/>
-              <a:t>24.01.2024</a:t>
+              <a:t>25.01.2024</a:t>
             </a:fld>
             <a:endParaRPr lang="ru-UA"/>
           </a:p>
@@ -939,7 +941,7 @@
           <a:p>
             <a:fld id="{0B8962EF-F649-4BF0-B0CB-D71423952154}" type="datetime1">
               <a:rPr lang="ru-UA" smtClean="0"/>
-              <a:t>24.01.2024</a:t>
+              <a:t>25.01.2024</a:t>
             </a:fld>
             <a:endParaRPr lang="ru-UA"/>
           </a:p>
@@ -1143,7 +1145,7 @@
           <a:p>
             <a:fld id="{52B04991-4203-48C2-B120-290746D8BC41}" type="datetime1">
               <a:rPr lang="ru-UA" smtClean="0"/>
-              <a:t>24.01.2024</a:t>
+              <a:t>25.01.2024</a:t>
             </a:fld>
             <a:endParaRPr lang="ru-UA"/>
           </a:p>
@@ -1357,7 +1359,7 @@
           <a:p>
             <a:fld id="{207AB121-CB86-4DCF-9E3D-2A0553392796}" type="datetime1">
               <a:rPr lang="ru-UA" smtClean="0"/>
-              <a:t>24.01.2024</a:t>
+              <a:t>25.01.2024</a:t>
             </a:fld>
             <a:endParaRPr lang="ru-UA"/>
           </a:p>
@@ -1561,7 +1563,7 @@
           <a:p>
             <a:fld id="{649A85F2-FE43-4F23-9D2D-558360D289A8}" type="datetime1">
               <a:rPr lang="ru-UA" smtClean="0"/>
-              <a:t>24.01.2024</a:t>
+              <a:t>25.01.2024</a:t>
             </a:fld>
             <a:endParaRPr lang="ru-UA"/>
           </a:p>
@@ -1841,7 +1843,7 @@
           <a:p>
             <a:fld id="{3C823F1E-25D4-4C19-9C16-57D27B598CE0}" type="datetime1">
               <a:rPr lang="ru-UA" smtClean="0"/>
-              <a:t>24.01.2024</a:t>
+              <a:t>25.01.2024</a:t>
             </a:fld>
             <a:endParaRPr lang="ru-UA"/>
           </a:p>
@@ -2113,7 +2115,7 @@
           <a:p>
             <a:fld id="{0FCE2DAB-FCC6-443D-91B5-F43A7B78C6B9}" type="datetime1">
               <a:rPr lang="ru-UA" smtClean="0"/>
-              <a:t>24.01.2024</a:t>
+              <a:t>25.01.2024</a:t>
             </a:fld>
             <a:endParaRPr lang="ru-UA"/>
           </a:p>
@@ -2532,7 +2534,7 @@
           <a:p>
             <a:fld id="{B647925C-949E-4C3F-B87F-94A502A4557F}" type="datetime1">
               <a:rPr lang="ru-UA" smtClean="0"/>
-              <a:t>24.01.2024</a:t>
+              <a:t>25.01.2024</a:t>
             </a:fld>
             <a:endParaRPr lang="ru-UA"/>
           </a:p>
@@ -2678,7 +2680,7 @@
           <a:p>
             <a:fld id="{9CE8CD01-0F29-4954-897C-1CC212183DBB}" type="datetime1">
               <a:rPr lang="ru-UA" smtClean="0"/>
-              <a:t>24.01.2024</a:t>
+              <a:t>25.01.2024</a:t>
             </a:fld>
             <a:endParaRPr lang="ru-UA"/>
           </a:p>
@@ -2795,7 +2797,7 @@
           <a:p>
             <a:fld id="{150095DC-0E76-47E5-A99D-2467BE30280E}" type="datetime1">
               <a:rPr lang="ru-UA" smtClean="0"/>
-              <a:t>24.01.2024</a:t>
+              <a:t>25.01.2024</a:t>
             </a:fld>
             <a:endParaRPr lang="ru-UA"/>
           </a:p>
@@ -3112,7 +3114,7 @@
           <a:p>
             <a:fld id="{CC7126BF-809C-4659-95F5-CCF148063973}" type="datetime1">
               <a:rPr lang="ru-UA" smtClean="0"/>
-              <a:t>24.01.2024</a:t>
+              <a:t>25.01.2024</a:t>
             </a:fld>
             <a:endParaRPr lang="ru-UA"/>
           </a:p>
@@ -3405,7 +3407,7 @@
           <a:p>
             <a:fld id="{D2EFC65D-56A3-455E-BFA5-3848A656380B}" type="datetime1">
               <a:rPr lang="ru-UA" smtClean="0"/>
-              <a:t>24.01.2024</a:t>
+              <a:t>25.01.2024</a:t>
             </a:fld>
             <a:endParaRPr lang="ru-UA"/>
           </a:p>
@@ -3652,7 +3654,7 @@
           <a:p>
             <a:fld id="{5E1B79E6-2B08-45F0-89F7-F914E581FDE2}" type="datetime1">
               <a:rPr lang="ru-UA" smtClean="0"/>
-              <a:t>24.01.2024</a:t>
+              <a:t>25.01.2024</a:t>
             </a:fld>
             <a:endParaRPr lang="ru-UA"/>
           </a:p>
@@ -4092,10 +4094,23 @@
         </p:nvSpPr>
         <p:spPr/>
         <p:txBody>
-          <a:bodyPr/>
-          <a:lstStyle/>
-          <a:p>
-            <a:endParaRPr lang="ru-UA"/>
+          <a:bodyPr>
+            <a:normAutofit fontScale="90000"/>
+          </a:bodyPr>
+          <a:lstStyle/>
+          <a:p>
+            <a:r>
+              <a:rPr lang="en-US" dirty="0"/>
+              <a:t>Software Development Life Cycle</a:t>
+            </a:r>
+            <a:br>
+              <a:rPr lang="en-US" dirty="0"/>
+            </a:br>
+            <a:r>
+              <a:rPr lang="en-US" dirty="0"/>
+              <a:t>(SDLC)</a:t>
+            </a:r>
+            <a:endParaRPr lang="ru-UA" dirty="0"/>
           </a:p>
         </p:txBody>
       </p:sp>
@@ -4296,63 +4311,47 @@
                 <a:ea typeface="+mj-ea"/>
                 <a:cs typeface="+mj-cs"/>
               </a:rPr>
-              <a:t>Continuous Monitoring</a:t>
-            </a:r>
-          </a:p>
-        </p:txBody>
-      </p:sp>
-      <p:sp>
-        <p:nvSpPr>
-          <p:cNvPr id="6" name="Rectangle 5">
-            <a:extLst>
-              <a:ext uri="{FF2B5EF4-FFF2-40B4-BE49-F238E27FC236}">
-                <a16:creationId xmlns:a16="http://schemas.microsoft.com/office/drawing/2014/main" id="{E04F08BD-B70E-B1A8-7328-EE29B18E4AA1}"/>
-              </a:ext>
-            </a:extLst>
-          </p:cNvPr>
-          <p:cNvSpPr/>
+              <a:t>Continuous Testing</a:t>
+            </a:r>
+          </a:p>
+        </p:txBody>
+      </p:sp>
+      <p:pic>
+        <p:nvPicPr>
+          <p:cNvPr id="4" name="Picture 3">
+            <a:extLst>
+              <a:ext uri="{FF2B5EF4-FFF2-40B4-BE49-F238E27FC236}">
+                <a16:creationId xmlns:a16="http://schemas.microsoft.com/office/drawing/2014/main" id="{0A4A47BB-B86E-CE6D-6738-81D9FF41289F}"/>
+              </a:ext>
+            </a:extLst>
+          </p:cNvPr>
+          <p:cNvPicPr>
+            <a:picLocks noChangeAspect="1"/>
+          </p:cNvPicPr>
           <p:nvPr/>
-        </p:nvSpPr>
+        </p:nvPicPr>
+        <p:blipFill>
+          <a:blip r:embed="rId2"/>
+          <a:stretch>
+            <a:fillRect/>
+          </a:stretch>
+        </p:blipFill>
         <p:spPr>
           <a:xfrm>
-            <a:off x="5669280" y="1574019"/>
-            <a:ext cx="4728754" cy="3333750"/>
+            <a:off x="4301190" y="1871838"/>
+            <a:ext cx="7890810" cy="2738111"/>
           </a:xfrm>
           <a:prstGeom prst="rect">
             <a:avLst/>
           </a:prstGeom>
         </p:spPr>
-        <p:style>
-          <a:lnRef idx="2">
-            <a:schemeClr val="accent1">
-              <a:shade val="15000"/>
-            </a:schemeClr>
-          </a:lnRef>
-          <a:fillRef idx="1">
-            <a:schemeClr val="accent1"/>
-          </a:fillRef>
-          <a:effectRef idx="0">
-            <a:schemeClr val="accent1"/>
-          </a:effectRef>
-          <a:fontRef idx="minor">
-            <a:schemeClr val="lt1"/>
-          </a:fontRef>
-        </p:style>
-        <p:txBody>
-          <a:bodyPr rtlCol="0" anchor="ctr"/>
-          <a:lstStyle/>
-          <a:p>
-            <a:pPr algn="ctr"/>
-            <a:endParaRPr lang="ru-UA"/>
-          </a:p>
-        </p:txBody>
-      </p:sp>
+      </p:pic>
       <p:sp>
         <p:nvSpPr>
           <p:cNvPr id="3" name="Footer Placeholder 2">
             <a:extLst>
               <a:ext uri="{FF2B5EF4-FFF2-40B4-BE49-F238E27FC236}">
-                <a16:creationId xmlns:a16="http://schemas.microsoft.com/office/drawing/2014/main" id="{754E75A3-56B9-C5B7-DA44-51667BD4A425}"/>
+                <a16:creationId xmlns:a16="http://schemas.microsoft.com/office/drawing/2014/main" id="{80329955-4474-A3E6-6930-05C4CE28FCC4}"/>
               </a:ext>
             </a:extLst>
           </p:cNvPr>
@@ -4379,7 +4378,7 @@
     </p:spTree>
     <p:extLst>
       <p:ext uri="{BB962C8B-B14F-4D97-AF65-F5344CB8AC3E}">
-        <p14:creationId xmlns:p14="http://schemas.microsoft.com/office/powerpoint/2010/main" val="3569579791"/>
+        <p14:creationId xmlns:p14="http://schemas.microsoft.com/office/powerpoint/2010/main" val="2476824021"/>
       </p:ext>
     </p:extLst>
   </p:cSld>
@@ -4414,6 +4413,66 @@
           <a:chExt cx="0" cy="0"/>
         </a:xfrm>
       </p:grpSpPr>
+      <p:pic>
+        <p:nvPicPr>
+          <p:cNvPr id="5" name="Picture 4">
+            <a:extLst>
+              <a:ext uri="{FF2B5EF4-FFF2-40B4-BE49-F238E27FC236}">
+                <a16:creationId xmlns:a16="http://schemas.microsoft.com/office/drawing/2014/main" id="{699631DD-6035-BB9F-11EC-4E9F01F1D081}"/>
+              </a:ext>
+            </a:extLst>
+          </p:cNvPr>
+          <p:cNvPicPr>
+            <a:picLocks noChangeAspect="1"/>
+          </p:cNvPicPr>
+          <p:nvPr/>
+        </p:nvPicPr>
+        <p:blipFill>
+          <a:blip r:embed="rId2"/>
+          <a:stretch>
+            <a:fillRect/>
+          </a:stretch>
+        </p:blipFill>
+        <p:spPr>
+          <a:xfrm>
+            <a:off x="3596349" y="3543046"/>
+            <a:ext cx="8447622" cy="1942953"/>
+          </a:xfrm>
+          <a:prstGeom prst="rect">
+            <a:avLst/>
+          </a:prstGeom>
+        </p:spPr>
+      </p:pic>
+      <p:pic>
+        <p:nvPicPr>
+          <p:cNvPr id="3" name="Picture 2">
+            <a:extLst>
+              <a:ext uri="{FF2B5EF4-FFF2-40B4-BE49-F238E27FC236}">
+                <a16:creationId xmlns:a16="http://schemas.microsoft.com/office/drawing/2014/main" id="{438AE1ED-C17A-0BC4-8D21-4B49E9F91B9F}"/>
+              </a:ext>
+            </a:extLst>
+          </p:cNvPr>
+          <p:cNvPicPr>
+            <a:picLocks noChangeAspect="1"/>
+          </p:cNvPicPr>
+          <p:nvPr/>
+        </p:nvPicPr>
+        <p:blipFill>
+          <a:blip r:embed="rId3"/>
+          <a:stretch>
+            <a:fillRect/>
+          </a:stretch>
+        </p:blipFill>
+        <p:spPr>
+          <a:xfrm>
+            <a:off x="3977321" y="1574019"/>
+            <a:ext cx="7996310" cy="1839152"/>
+          </a:xfrm>
+          <a:prstGeom prst="rect">
+            <a:avLst/>
+          </a:prstGeom>
+        </p:spPr>
+      </p:pic>
       <p:sp>
         <p:nvSpPr>
           <p:cNvPr id="24" name="Down Arrow 7">
@@ -4519,7 +4578,184 @@
                 <a:ea typeface="+mj-ea"/>
                 <a:cs typeface="+mj-cs"/>
               </a:rPr>
-              <a:t>Continuous Feedback</a:t>
+              <a:t>Continuous Deployment/ Continuous Delivery</a:t>
+            </a:r>
+          </a:p>
+        </p:txBody>
+      </p:sp>
+      <p:sp>
+        <p:nvSpPr>
+          <p:cNvPr id="4" name="Footer Placeholder 3">
+            <a:extLst>
+              <a:ext uri="{FF2B5EF4-FFF2-40B4-BE49-F238E27FC236}">
+                <a16:creationId xmlns:a16="http://schemas.microsoft.com/office/drawing/2014/main" id="{E14FB9CA-46BC-D1B1-5A56-C471B73471E3}"/>
+              </a:ext>
+            </a:extLst>
+          </p:cNvPr>
+          <p:cNvSpPr>
+            <a:spLocks noGrp="1"/>
+          </p:cNvSpPr>
+          <p:nvPr>
+            <p:ph type="ftr" sz="quarter" idx="11"/>
+          </p:nvPr>
+        </p:nvSpPr>
+        <p:spPr/>
+        <p:txBody>
+          <a:bodyPr/>
+          <a:lstStyle/>
+          <a:p>
+            <a:r>
+              <a:rPr lang="es-ES"/>
+              <a:t>Step 1 - Model - ver. 1</a:t>
+            </a:r>
+            <a:endParaRPr lang="ru-UA"/>
+          </a:p>
+        </p:txBody>
+      </p:sp>
+    </p:spTree>
+    <p:extLst>
+      <p:ext uri="{BB962C8B-B14F-4D97-AF65-F5344CB8AC3E}">
+        <p14:creationId xmlns:p14="http://schemas.microsoft.com/office/powerpoint/2010/main" val="303933854"/>
+      </p:ext>
+    </p:extLst>
+  </p:cSld>
+  <p:clrMapOvr>
+    <a:masterClrMapping/>
+  </p:clrMapOvr>
+</p:sld>
+</file>
+
+<file path=ppt/slides/slide12.xml><?xml version="1.0" encoding="utf-8"?>
+<p:sld xmlns:a="http://schemas.openxmlformats.org/drawingml/2006/main" xmlns:r="http://schemas.openxmlformats.org/officeDocument/2006/relationships" xmlns:p="http://schemas.openxmlformats.org/presentationml/2006/main">
+  <p:cSld>
+    <p:bg>
+      <p:bgPr>
+        <a:solidFill>
+          <a:schemeClr val="bg1"/>
+        </a:solidFill>
+        <a:effectLst/>
+      </p:bgPr>
+    </p:bg>
+    <p:spTree>
+      <p:nvGrpSpPr>
+        <p:cNvPr id="1" name=""/>
+        <p:cNvGrpSpPr/>
+        <p:nvPr/>
+      </p:nvGrpSpPr>
+      <p:grpSpPr>
+        <a:xfrm>
+          <a:off x="0" y="0"/>
+          <a:ext cx="0" cy="0"/>
+          <a:chOff x="0" y="0"/>
+          <a:chExt cx="0" cy="0"/>
+        </a:xfrm>
+      </p:grpSpPr>
+      <p:sp>
+        <p:nvSpPr>
+          <p:cNvPr id="24" name="Down Arrow 7">
+            <a:extLst>
+              <a:ext uri="{FF2B5EF4-FFF2-40B4-BE49-F238E27FC236}">
+                <a16:creationId xmlns:a16="http://schemas.microsoft.com/office/drawing/2014/main" id="{D4771268-CB57-404A-9271-370EB28F6090}"/>
+              </a:ext>
+              <a:ext uri="{C183D7F6-B498-43B3-948B-1728B52AA6E4}">
+                <adec:decorative xmlns:adec="http://schemas.microsoft.com/office/drawing/2017/decorative" val="1"/>
+              </a:ext>
+            </a:extLst>
+          </p:cNvPr>
+          <p:cNvSpPr>
+            <a:spLocks noGrp="1" noRot="1" noChangeAspect="1" noMove="1" noResize="1" noEditPoints="1" noAdjustHandles="1" noChangeArrowheads="1" noChangeShapeType="1" noTextEdit="1"/>
+          </p:cNvSpPr>
+          <p:nvPr>
+            <p:extLst>
+              <p:ext uri="{386F3935-93C4-4BCD-93E2-E3B085C9AB24}">
+                <p16:designElem xmlns:p16="http://schemas.microsoft.com/office/powerpoint/2015/main" val="1"/>
+              </p:ext>
+            </p:extLst>
+          </p:nvPr>
+        </p:nvSpPr>
+        <p:spPr>
+          <a:xfrm rot="16200000">
+            <a:off x="800100" y="1491343"/>
+            <a:ext cx="3333749" cy="3499103"/>
+          </a:xfrm>
+          <a:prstGeom prst="downArrow">
+            <a:avLst>
+              <a:gd name="adj1" fmla="val 100000"/>
+              <a:gd name="adj2" fmla="val 15788"/>
+            </a:avLst>
+          </a:prstGeom>
+          <a:solidFill>
+            <a:srgbClr val="404040"/>
+          </a:solidFill>
+          <a:ln w="53975">
+            <a:noFill/>
+          </a:ln>
+        </p:spPr>
+        <p:style>
+          <a:lnRef idx="2">
+            <a:schemeClr val="accent1">
+              <a:shade val="50000"/>
+            </a:schemeClr>
+          </a:lnRef>
+          <a:fillRef idx="1">
+            <a:schemeClr val="accent1"/>
+          </a:fillRef>
+          <a:effectRef idx="0">
+            <a:schemeClr val="accent1"/>
+          </a:effectRef>
+          <a:fontRef idx="minor">
+            <a:schemeClr val="lt1"/>
+          </a:fontRef>
+        </p:style>
+        <p:txBody>
+          <a:bodyPr rtlCol="0" anchor="ctr"/>
+          <a:lstStyle/>
+          <a:p>
+            <a:pPr algn="ctr"/>
+            <a:endParaRPr lang="en-US"/>
+          </a:p>
+        </p:txBody>
+      </p:sp>
+      <p:sp>
+        <p:nvSpPr>
+          <p:cNvPr id="2" name="Title 1">
+            <a:extLst>
+              <a:ext uri="{FF2B5EF4-FFF2-40B4-BE49-F238E27FC236}">
+                <a16:creationId xmlns:a16="http://schemas.microsoft.com/office/drawing/2014/main" id="{53C5D828-9666-E312-B574-9FE965A7D6BE}"/>
+              </a:ext>
+            </a:extLst>
+          </p:cNvPr>
+          <p:cNvSpPr>
+            <a:spLocks noGrp="1"/>
+          </p:cNvSpPr>
+          <p:nvPr>
+            <p:ph type="title"/>
+          </p:nvPr>
+        </p:nvSpPr>
+        <p:spPr>
+          <a:xfrm>
+            <a:off x="944380" y="1967266"/>
+            <a:ext cx="2713220" cy="2547257"/>
+          </a:xfrm>
+          <a:noFill/>
+        </p:spPr>
+        <p:txBody>
+          <a:bodyPr vert="horz" lIns="91440" tIns="45720" rIns="91440" bIns="45720" rtlCol="0" anchor="ctr">
+            <a:normAutofit/>
+          </a:bodyPr>
+          <a:lstStyle/>
+          <a:p>
+            <a:pPr algn="ctr"/>
+            <a:r>
+              <a:rPr lang="en-US" sz="3600" kern="1200" dirty="0">
+                <a:solidFill>
+                  <a:srgbClr val="FFFFFF"/>
+                </a:solidFill>
+                <a:latin typeface="+mj-lt"/>
+                <a:ea typeface="+mj-ea"/>
+                <a:cs typeface="+mj-cs"/>
+              </a:rPr>
+              <a:t>Continuous Monitoring</a:t>
             </a:r>
           </a:p>
         </p:txBody>
@@ -4575,6 +4811,229 @@
           <p:cNvPr id="3" name="Footer Placeholder 2">
             <a:extLst>
               <a:ext uri="{FF2B5EF4-FFF2-40B4-BE49-F238E27FC236}">
+                <a16:creationId xmlns:a16="http://schemas.microsoft.com/office/drawing/2014/main" id="{754E75A3-56B9-C5B7-DA44-51667BD4A425}"/>
+              </a:ext>
+            </a:extLst>
+          </p:cNvPr>
+          <p:cNvSpPr>
+            <a:spLocks noGrp="1"/>
+          </p:cNvSpPr>
+          <p:nvPr>
+            <p:ph type="ftr" sz="quarter" idx="11"/>
+          </p:nvPr>
+        </p:nvSpPr>
+        <p:spPr/>
+        <p:txBody>
+          <a:bodyPr/>
+          <a:lstStyle/>
+          <a:p>
+            <a:r>
+              <a:rPr lang="es-ES"/>
+              <a:t>Step 1 - Model - ver. 1</a:t>
+            </a:r>
+            <a:endParaRPr lang="ru-UA"/>
+          </a:p>
+        </p:txBody>
+      </p:sp>
+    </p:spTree>
+    <p:extLst>
+      <p:ext uri="{BB962C8B-B14F-4D97-AF65-F5344CB8AC3E}">
+        <p14:creationId xmlns:p14="http://schemas.microsoft.com/office/powerpoint/2010/main" val="3569579791"/>
+      </p:ext>
+    </p:extLst>
+  </p:cSld>
+  <p:clrMapOvr>
+    <a:masterClrMapping/>
+  </p:clrMapOvr>
+</p:sld>
+</file>
+
+<file path=ppt/slides/slide13.xml><?xml version="1.0" encoding="utf-8"?>
+<p:sld xmlns:a="http://schemas.openxmlformats.org/drawingml/2006/main" xmlns:r="http://schemas.openxmlformats.org/officeDocument/2006/relationships" xmlns:p="http://schemas.openxmlformats.org/presentationml/2006/main">
+  <p:cSld>
+    <p:bg>
+      <p:bgPr>
+        <a:solidFill>
+          <a:schemeClr val="bg1"/>
+        </a:solidFill>
+        <a:effectLst/>
+      </p:bgPr>
+    </p:bg>
+    <p:spTree>
+      <p:nvGrpSpPr>
+        <p:cNvPr id="1" name=""/>
+        <p:cNvGrpSpPr/>
+        <p:nvPr/>
+      </p:nvGrpSpPr>
+      <p:grpSpPr>
+        <a:xfrm>
+          <a:off x="0" y="0"/>
+          <a:ext cx="0" cy="0"/>
+          <a:chOff x="0" y="0"/>
+          <a:chExt cx="0" cy="0"/>
+        </a:xfrm>
+      </p:grpSpPr>
+      <p:sp>
+        <p:nvSpPr>
+          <p:cNvPr id="24" name="Down Arrow 7">
+            <a:extLst>
+              <a:ext uri="{FF2B5EF4-FFF2-40B4-BE49-F238E27FC236}">
+                <a16:creationId xmlns:a16="http://schemas.microsoft.com/office/drawing/2014/main" id="{D4771268-CB57-404A-9271-370EB28F6090}"/>
+              </a:ext>
+              <a:ext uri="{C183D7F6-B498-43B3-948B-1728B52AA6E4}">
+                <adec:decorative xmlns:adec="http://schemas.microsoft.com/office/drawing/2017/decorative" val="1"/>
+              </a:ext>
+            </a:extLst>
+          </p:cNvPr>
+          <p:cNvSpPr>
+            <a:spLocks noGrp="1" noRot="1" noChangeAspect="1" noMove="1" noResize="1" noEditPoints="1" noAdjustHandles="1" noChangeArrowheads="1" noChangeShapeType="1" noTextEdit="1"/>
+          </p:cNvSpPr>
+          <p:nvPr>
+            <p:extLst>
+              <p:ext uri="{386F3935-93C4-4BCD-93E2-E3B085C9AB24}">
+                <p16:designElem xmlns:p16="http://schemas.microsoft.com/office/powerpoint/2015/main" val="1"/>
+              </p:ext>
+            </p:extLst>
+          </p:nvPr>
+        </p:nvSpPr>
+        <p:spPr>
+          <a:xfrm rot="16200000">
+            <a:off x="800100" y="1491343"/>
+            <a:ext cx="3333749" cy="3499103"/>
+          </a:xfrm>
+          <a:prstGeom prst="downArrow">
+            <a:avLst>
+              <a:gd name="adj1" fmla="val 100000"/>
+              <a:gd name="adj2" fmla="val 15788"/>
+            </a:avLst>
+          </a:prstGeom>
+          <a:solidFill>
+            <a:srgbClr val="404040"/>
+          </a:solidFill>
+          <a:ln w="53975">
+            <a:noFill/>
+          </a:ln>
+        </p:spPr>
+        <p:style>
+          <a:lnRef idx="2">
+            <a:schemeClr val="accent1">
+              <a:shade val="50000"/>
+            </a:schemeClr>
+          </a:lnRef>
+          <a:fillRef idx="1">
+            <a:schemeClr val="accent1"/>
+          </a:fillRef>
+          <a:effectRef idx="0">
+            <a:schemeClr val="accent1"/>
+          </a:effectRef>
+          <a:fontRef idx="minor">
+            <a:schemeClr val="lt1"/>
+          </a:fontRef>
+        </p:style>
+        <p:txBody>
+          <a:bodyPr rtlCol="0" anchor="ctr"/>
+          <a:lstStyle/>
+          <a:p>
+            <a:pPr algn="ctr"/>
+            <a:endParaRPr lang="en-US"/>
+          </a:p>
+        </p:txBody>
+      </p:sp>
+      <p:sp>
+        <p:nvSpPr>
+          <p:cNvPr id="2" name="Title 1">
+            <a:extLst>
+              <a:ext uri="{FF2B5EF4-FFF2-40B4-BE49-F238E27FC236}">
+                <a16:creationId xmlns:a16="http://schemas.microsoft.com/office/drawing/2014/main" id="{53C5D828-9666-E312-B574-9FE965A7D6BE}"/>
+              </a:ext>
+            </a:extLst>
+          </p:cNvPr>
+          <p:cNvSpPr>
+            <a:spLocks noGrp="1"/>
+          </p:cNvSpPr>
+          <p:nvPr>
+            <p:ph type="title"/>
+          </p:nvPr>
+        </p:nvSpPr>
+        <p:spPr>
+          <a:xfrm>
+            <a:off x="944380" y="1967266"/>
+            <a:ext cx="2713220" cy="2547257"/>
+          </a:xfrm>
+          <a:noFill/>
+        </p:spPr>
+        <p:txBody>
+          <a:bodyPr vert="horz" lIns="91440" tIns="45720" rIns="91440" bIns="45720" rtlCol="0" anchor="ctr">
+            <a:normAutofit/>
+          </a:bodyPr>
+          <a:lstStyle/>
+          <a:p>
+            <a:pPr algn="ctr"/>
+            <a:r>
+              <a:rPr lang="en-US" sz="3600" kern="1200" dirty="0">
+                <a:solidFill>
+                  <a:srgbClr val="FFFFFF"/>
+                </a:solidFill>
+                <a:latin typeface="+mj-lt"/>
+                <a:ea typeface="+mj-ea"/>
+                <a:cs typeface="+mj-cs"/>
+              </a:rPr>
+              <a:t>Continuous Feedback</a:t>
+            </a:r>
+          </a:p>
+        </p:txBody>
+      </p:sp>
+      <p:sp>
+        <p:nvSpPr>
+          <p:cNvPr id="6" name="Rectangle 5">
+            <a:extLst>
+              <a:ext uri="{FF2B5EF4-FFF2-40B4-BE49-F238E27FC236}">
+                <a16:creationId xmlns:a16="http://schemas.microsoft.com/office/drawing/2014/main" id="{E04F08BD-B70E-B1A8-7328-EE29B18E4AA1}"/>
+              </a:ext>
+            </a:extLst>
+          </p:cNvPr>
+          <p:cNvSpPr/>
+          <p:nvPr/>
+        </p:nvSpPr>
+        <p:spPr>
+          <a:xfrm>
+            <a:off x="5669280" y="1574019"/>
+            <a:ext cx="4728754" cy="3333750"/>
+          </a:xfrm>
+          <a:prstGeom prst="rect">
+            <a:avLst/>
+          </a:prstGeom>
+        </p:spPr>
+        <p:style>
+          <a:lnRef idx="2">
+            <a:schemeClr val="accent1">
+              <a:shade val="15000"/>
+            </a:schemeClr>
+          </a:lnRef>
+          <a:fillRef idx="1">
+            <a:schemeClr val="accent1"/>
+          </a:fillRef>
+          <a:effectRef idx="0">
+            <a:schemeClr val="accent1"/>
+          </a:effectRef>
+          <a:fontRef idx="minor">
+            <a:schemeClr val="lt1"/>
+          </a:fontRef>
+        </p:style>
+        <p:txBody>
+          <a:bodyPr rtlCol="0" anchor="ctr"/>
+          <a:lstStyle/>
+          <a:p>
+            <a:pPr algn="ctr"/>
+            <a:endParaRPr lang="ru-UA"/>
+          </a:p>
+        </p:txBody>
+      </p:sp>
+      <p:sp>
+        <p:nvSpPr>
+          <p:cNvPr id="3" name="Footer Placeholder 2">
+            <a:extLst>
+              <a:ext uri="{FF2B5EF4-FFF2-40B4-BE49-F238E27FC236}">
                 <a16:creationId xmlns:a16="http://schemas.microsoft.com/office/drawing/2014/main" id="{76104783-4055-4469-A4B0-26C1AFE8E1B7}"/>
               </a:ext>
             </a:extLst>
@@ -4612,7 +5071,7 @@
 </p:sld>
 </file>
 
-<file path=ppt/slides/slide12.xml><?xml version="1.0" encoding="utf-8"?>
+<file path=ppt/slides/slide14.xml><?xml version="1.0" encoding="utf-8"?>
 <p:sld xmlns:a="http://schemas.openxmlformats.org/drawingml/2006/main" xmlns:r="http://schemas.openxmlformats.org/officeDocument/2006/relationships" xmlns:p="http://schemas.openxmlformats.org/presentationml/2006/main">
   <p:cSld>
     <p:bg>
@@ -4944,8 +5403,8 @@
         </p:nvSpPr>
         <p:spPr>
           <a:xfrm>
-            <a:off x="1028700" y="1967266"/>
-            <a:ext cx="2628900" cy="2547257"/>
+            <a:off x="889000" y="1967266"/>
+            <a:ext cx="2768600" cy="2547257"/>
           </a:xfrm>
           <a:noFill/>
         </p:spPr>
@@ -4965,26 +5424,74 @@
                 <a:ea typeface="+mj-ea"/>
                 <a:cs typeface="+mj-cs"/>
               </a:rPr>
-              <a:t>What’s DevOps?</a:t>
-            </a:r>
+              <a:t>Software Development Life Cycle</a:t>
+            </a:r>
+            <a:br>
+              <a:rPr lang="en-US" sz="3600" kern="1200" dirty="0">
+                <a:solidFill>
+                  <a:srgbClr val="FFFFFF"/>
+                </a:solidFill>
+                <a:latin typeface="+mj-lt"/>
+                <a:ea typeface="+mj-ea"/>
+                <a:cs typeface="+mj-cs"/>
+              </a:rPr>
+            </a:br>
+            <a:r>
+              <a:rPr lang="en-US" sz="3600" kern="1200" dirty="0">
+                <a:solidFill>
+                  <a:srgbClr val="FFFFFF"/>
+                </a:solidFill>
+                <a:latin typeface="+mj-lt"/>
+                <a:ea typeface="+mj-ea"/>
+                <a:cs typeface="+mj-cs"/>
+              </a:rPr>
+              <a:t>(SDLC)</a:t>
+            </a:r>
+          </a:p>
+        </p:txBody>
+      </p:sp>
+      <p:sp>
+        <p:nvSpPr>
+          <p:cNvPr id="3" name="Footer Placeholder 2">
+            <a:extLst>
+              <a:ext uri="{FF2B5EF4-FFF2-40B4-BE49-F238E27FC236}">
+                <a16:creationId xmlns:a16="http://schemas.microsoft.com/office/drawing/2014/main" id="{5AA19FA0-A765-8169-03F1-928E3EF7B595}"/>
+              </a:ext>
+            </a:extLst>
+          </p:cNvPr>
+          <p:cNvSpPr>
+            <a:spLocks noGrp="1"/>
+          </p:cNvSpPr>
+          <p:nvPr>
+            <p:ph type="ftr" sz="quarter" idx="11"/>
+          </p:nvPr>
+        </p:nvSpPr>
+        <p:spPr/>
+        <p:txBody>
+          <a:bodyPr/>
+          <a:lstStyle/>
+          <a:p>
+            <a:r>
+              <a:rPr lang="es-ES"/>
+              <a:t>Step 1 - Model - ver. 1</a:t>
+            </a:r>
+            <a:endParaRPr lang="ru-UA"/>
           </a:p>
         </p:txBody>
       </p:sp>
       <p:pic>
         <p:nvPicPr>
-          <p:cNvPr id="4" name="Content Placeholder 3">
-            <a:extLst>
-              <a:ext uri="{FF2B5EF4-FFF2-40B4-BE49-F238E27FC236}">
-                <a16:creationId xmlns:a16="http://schemas.microsoft.com/office/drawing/2014/main" id="{CEF7F2EB-A082-7F34-2340-651EAE68E3EE}"/>
+          <p:cNvPr id="5" name="Рисунок 4">
+            <a:extLst>
+              <a:ext uri="{FF2B5EF4-FFF2-40B4-BE49-F238E27FC236}">
+                <a16:creationId xmlns:a16="http://schemas.microsoft.com/office/drawing/2014/main" id="{35ABBD68-9FD2-4A63-BB45-97784C3E273A}"/>
               </a:ext>
             </a:extLst>
           </p:cNvPr>
           <p:cNvPicPr>
-            <a:picLocks noGrp="1" noChangeAspect="1"/>
+            <a:picLocks noChangeAspect="1"/>
           </p:cNvPicPr>
-          <p:nvPr>
-            <p:ph idx="1"/>
-          </p:nvPr>
+          <p:nvPr/>
         </p:nvPicPr>
         <p:blipFill>
           <a:blip r:embed="rId2"/>
@@ -4994,47 +5501,18 @@
         </p:blipFill>
         <p:spPr>
           <a:xfrm>
-            <a:off x="4693878" y="1308395"/>
-            <a:ext cx="6780700" cy="3864998"/>
+            <a:off x="4764616" y="1669269"/>
+            <a:ext cx="6787596" cy="3393798"/>
           </a:xfrm>
           <a:prstGeom prst="rect">
             <a:avLst/>
           </a:prstGeom>
         </p:spPr>
       </p:pic>
-      <p:sp>
-        <p:nvSpPr>
-          <p:cNvPr id="3" name="Footer Placeholder 2">
-            <a:extLst>
-              <a:ext uri="{FF2B5EF4-FFF2-40B4-BE49-F238E27FC236}">
-                <a16:creationId xmlns:a16="http://schemas.microsoft.com/office/drawing/2014/main" id="{5AA19FA0-A765-8169-03F1-928E3EF7B595}"/>
-              </a:ext>
-            </a:extLst>
-          </p:cNvPr>
-          <p:cNvSpPr>
-            <a:spLocks noGrp="1"/>
-          </p:cNvSpPr>
-          <p:nvPr>
-            <p:ph type="ftr" sz="quarter" idx="11"/>
-          </p:nvPr>
-        </p:nvSpPr>
-        <p:spPr/>
-        <p:txBody>
-          <a:bodyPr/>
-          <a:lstStyle/>
-          <a:p>
-            <a:r>
-              <a:rPr lang="es-ES"/>
-              <a:t>Step 1 - Model - ver. 1</a:t>
-            </a:r>
-            <a:endParaRPr lang="ru-UA"/>
-          </a:p>
-        </p:txBody>
-      </p:sp>
     </p:spTree>
     <p:extLst>
       <p:ext uri="{BB962C8B-B14F-4D97-AF65-F5344CB8AC3E}">
-        <p14:creationId xmlns:p14="http://schemas.microsoft.com/office/powerpoint/2010/main" val="1956460482"/>
+        <p14:creationId xmlns:p14="http://schemas.microsoft.com/office/powerpoint/2010/main" val="4197480136"/>
       </p:ext>
     </p:extLst>
   </p:cSld>
@@ -5153,8 +5631,8 @@
         </p:nvSpPr>
         <p:spPr>
           <a:xfrm>
-            <a:off x="1028700" y="1967266"/>
-            <a:ext cx="2628900" cy="2547257"/>
+            <a:off x="889000" y="1967266"/>
+            <a:ext cx="2768600" cy="2547257"/>
           </a:xfrm>
           <a:noFill/>
         </p:spPr>
@@ -5174,90 +5652,95 @@
                 <a:ea typeface="+mj-ea"/>
                 <a:cs typeface="+mj-cs"/>
               </a:rPr>
-              <a:t>What’s DevOps?</a:t>
-            </a:r>
-          </a:p>
-        </p:txBody>
-      </p:sp>
-      <p:sp>
-        <p:nvSpPr>
-          <p:cNvPr id="3" name="Rectangle 2">
-            <a:extLst>
-              <a:ext uri="{FF2B5EF4-FFF2-40B4-BE49-F238E27FC236}">
-                <a16:creationId xmlns:a16="http://schemas.microsoft.com/office/drawing/2014/main" id="{F79F3174-C140-0248-35F5-C80A867261E7}"/>
-              </a:ext>
-            </a:extLst>
-          </p:cNvPr>
-          <p:cNvSpPr/>
+              <a:t>Stages of </a:t>
+            </a:r>
+            <a:br>
+              <a:rPr lang="en-US" sz="3600" kern="1200" dirty="0">
+                <a:solidFill>
+                  <a:srgbClr val="FFFFFF"/>
+                </a:solidFill>
+                <a:latin typeface="+mj-lt"/>
+                <a:ea typeface="+mj-ea"/>
+                <a:cs typeface="+mj-cs"/>
+              </a:rPr>
+            </a:br>
+            <a:r>
+              <a:rPr lang="en-US" sz="3600" kern="1200" dirty="0">
+                <a:solidFill>
+                  <a:srgbClr val="FFFFFF"/>
+                </a:solidFill>
+                <a:latin typeface="+mj-lt"/>
+                <a:ea typeface="+mj-ea"/>
+                <a:cs typeface="+mj-cs"/>
+              </a:rPr>
+              <a:t>SDLC</a:t>
+            </a:r>
+          </a:p>
+        </p:txBody>
+      </p:sp>
+      <p:sp>
+        <p:nvSpPr>
+          <p:cNvPr id="3" name="Footer Placeholder 2">
+            <a:extLst>
+              <a:ext uri="{FF2B5EF4-FFF2-40B4-BE49-F238E27FC236}">
+                <a16:creationId xmlns:a16="http://schemas.microsoft.com/office/drawing/2014/main" id="{5AA19FA0-A765-8169-03F1-928E3EF7B595}"/>
+              </a:ext>
+            </a:extLst>
+          </p:cNvPr>
+          <p:cNvSpPr>
+            <a:spLocks noGrp="1"/>
+          </p:cNvSpPr>
+          <p:nvPr>
+            <p:ph type="ftr" sz="quarter" idx="11"/>
+          </p:nvPr>
+        </p:nvSpPr>
+        <p:spPr/>
+        <p:txBody>
+          <a:bodyPr/>
+          <a:lstStyle/>
+          <a:p>
+            <a:r>
+              <a:rPr lang="es-ES"/>
+              <a:t>Step 1 - Model - ver. 1</a:t>
+            </a:r>
+            <a:endParaRPr lang="ru-UA"/>
+          </a:p>
+        </p:txBody>
+      </p:sp>
+      <p:pic>
+        <p:nvPicPr>
+          <p:cNvPr id="6" name="Рисунок 5">
+            <a:extLst>
+              <a:ext uri="{FF2B5EF4-FFF2-40B4-BE49-F238E27FC236}">
+                <a16:creationId xmlns:a16="http://schemas.microsoft.com/office/drawing/2014/main" id="{BDB4DD57-1DD7-48B1-ABFB-EE3016703034}"/>
+              </a:ext>
+            </a:extLst>
+          </p:cNvPr>
+          <p:cNvPicPr>
+            <a:picLocks noChangeAspect="1"/>
+          </p:cNvPicPr>
           <p:nvPr/>
-        </p:nvSpPr>
+        </p:nvPicPr>
+        <p:blipFill>
+          <a:blip r:embed="rId2"/>
+          <a:stretch>
+            <a:fillRect/>
+          </a:stretch>
+        </p:blipFill>
         <p:spPr>
           <a:xfrm>
-            <a:off x="4724400" y="1301258"/>
-            <a:ext cx="6750178" cy="3879272"/>
+            <a:off x="4216526" y="1443420"/>
+            <a:ext cx="7861479" cy="3594948"/>
           </a:xfrm>
           <a:prstGeom prst="rect">
             <a:avLst/>
           </a:prstGeom>
         </p:spPr>
-        <p:style>
-          <a:lnRef idx="2">
-            <a:schemeClr val="accent1">
-              <a:shade val="15000"/>
-            </a:schemeClr>
-          </a:lnRef>
-          <a:fillRef idx="1">
-            <a:schemeClr val="accent1"/>
-          </a:fillRef>
-          <a:effectRef idx="0">
-            <a:schemeClr val="accent1"/>
-          </a:effectRef>
-          <a:fontRef idx="minor">
-            <a:schemeClr val="lt1"/>
-          </a:fontRef>
-        </p:style>
-        <p:txBody>
-          <a:bodyPr rtlCol="0" anchor="ctr"/>
-          <a:lstStyle/>
-          <a:p>
-            <a:pPr algn="ctr"/>
-            <a:endParaRPr lang="ru-UA"/>
-          </a:p>
-        </p:txBody>
-      </p:sp>
-      <p:sp>
-        <p:nvSpPr>
-          <p:cNvPr id="4" name="Footer Placeholder 3">
-            <a:extLst>
-              <a:ext uri="{FF2B5EF4-FFF2-40B4-BE49-F238E27FC236}">
-                <a16:creationId xmlns:a16="http://schemas.microsoft.com/office/drawing/2014/main" id="{ADFF8568-DBE3-6323-E204-CE7FBE7F8761}"/>
-              </a:ext>
-            </a:extLst>
-          </p:cNvPr>
-          <p:cNvSpPr>
-            <a:spLocks noGrp="1"/>
-          </p:cNvSpPr>
-          <p:nvPr>
-            <p:ph type="ftr" sz="quarter" idx="11"/>
-          </p:nvPr>
-        </p:nvSpPr>
-        <p:spPr/>
-        <p:txBody>
-          <a:bodyPr/>
-          <a:lstStyle/>
-          <a:p>
-            <a:r>
-              <a:rPr lang="es-ES"/>
-              <a:t>Step 1 - Model - ver. 1</a:t>
-            </a:r>
-            <a:endParaRPr lang="ru-UA"/>
-          </a:p>
-        </p:txBody>
-      </p:sp>
+      </p:pic>
     </p:spTree>
     <p:extLst>
       <p:ext uri="{BB962C8B-B14F-4D97-AF65-F5344CB8AC3E}">
-        <p14:creationId xmlns:p14="http://schemas.microsoft.com/office/powerpoint/2010/main" val="1539823432"/>
+        <p14:creationId xmlns:p14="http://schemas.microsoft.com/office/powerpoint/2010/main" val="231577604"/>
       </p:ext>
     </p:extLst>
   </p:cSld>
@@ -5397,45 +5880,26 @@
                 <a:ea typeface="+mj-ea"/>
                 <a:cs typeface="+mj-cs"/>
               </a:rPr>
-              <a:t>DevOps</a:t>
-            </a:r>
-            <a:br>
-              <a:rPr lang="en-US" sz="3600" kern="1200" dirty="0">
-                <a:solidFill>
-                  <a:srgbClr val="FFFFFF"/>
-                </a:solidFill>
-                <a:latin typeface="+mj-lt"/>
-                <a:ea typeface="+mj-ea"/>
-                <a:cs typeface="+mj-cs"/>
-              </a:rPr>
-            </a:br>
-            <a:r>
-              <a:rPr lang="en-US" sz="3600" kern="1200" dirty="0">
-                <a:solidFill>
-                  <a:srgbClr val="FFFFFF"/>
-                </a:solidFill>
-                <a:latin typeface="+mj-lt"/>
-                <a:ea typeface="+mj-ea"/>
-                <a:cs typeface="+mj-cs"/>
-              </a:rPr>
-              <a:t>Lifecycle</a:t>
+              <a:t>What’s DevOps?</a:t>
             </a:r>
           </a:p>
         </p:txBody>
       </p:sp>
       <p:pic>
         <p:nvPicPr>
-          <p:cNvPr id="4" name="Picture 3">
-            <a:extLst>
-              <a:ext uri="{FF2B5EF4-FFF2-40B4-BE49-F238E27FC236}">
-                <a16:creationId xmlns:a16="http://schemas.microsoft.com/office/drawing/2014/main" id="{385F9644-E8EA-6C22-DF80-DC79BE06769D}"/>
+          <p:cNvPr id="4" name="Content Placeholder 3">
+            <a:extLst>
+              <a:ext uri="{FF2B5EF4-FFF2-40B4-BE49-F238E27FC236}">
+                <a16:creationId xmlns:a16="http://schemas.microsoft.com/office/drawing/2014/main" id="{CEF7F2EB-A082-7F34-2340-651EAE68E3EE}"/>
               </a:ext>
             </a:extLst>
           </p:cNvPr>
           <p:cNvPicPr>
-            <a:picLocks noChangeAspect="1"/>
+            <a:picLocks noGrp="1" noChangeAspect="1"/>
           </p:cNvPicPr>
-          <p:nvPr/>
+          <p:nvPr>
+            <p:ph idx="1"/>
+          </p:nvPr>
         </p:nvPicPr>
         <p:blipFill>
           <a:blip r:embed="rId2"/>
@@ -5445,8 +5909,8 @@
         </p:blipFill>
         <p:spPr>
           <a:xfrm>
-            <a:off x="5548296" y="869148"/>
-            <a:ext cx="5119704" cy="5119704"/>
+            <a:off x="4693878" y="1308395"/>
+            <a:ext cx="6780700" cy="3864998"/>
           </a:xfrm>
           <a:prstGeom prst="rect">
             <a:avLst/>
@@ -5458,7 +5922,7 @@
           <p:cNvPr id="3" name="Footer Placeholder 2">
             <a:extLst>
               <a:ext uri="{FF2B5EF4-FFF2-40B4-BE49-F238E27FC236}">
-                <a16:creationId xmlns:a16="http://schemas.microsoft.com/office/drawing/2014/main" id="{E6B5C946-F0F9-B52E-3D55-7656B83416CF}"/>
+                <a16:creationId xmlns:a16="http://schemas.microsoft.com/office/drawing/2014/main" id="{5AA19FA0-A765-8169-03F1-928E3EF7B595}"/>
               </a:ext>
             </a:extLst>
           </p:cNvPr>
@@ -5485,7 +5949,7 @@
     </p:spTree>
     <p:extLst>
       <p:ext uri="{BB962C8B-B14F-4D97-AF65-F5344CB8AC3E}">
-        <p14:creationId xmlns:p14="http://schemas.microsoft.com/office/powerpoint/2010/main" val="2385514391"/>
+        <p14:creationId xmlns:p14="http://schemas.microsoft.com/office/powerpoint/2010/main" val="1956460482"/>
       </p:ext>
     </p:extLst>
   </p:cSld>
@@ -5520,36 +5984,6 @@
           <a:chExt cx="0" cy="0"/>
         </a:xfrm>
       </p:grpSpPr>
-      <p:pic>
-        <p:nvPicPr>
-          <p:cNvPr id="3" name="Picture 2">
-            <a:extLst>
-              <a:ext uri="{FF2B5EF4-FFF2-40B4-BE49-F238E27FC236}">
-                <a16:creationId xmlns:a16="http://schemas.microsoft.com/office/drawing/2014/main" id="{15AAA44A-9E89-5E99-D8F5-8E9AA8D7D0DA}"/>
-              </a:ext>
-            </a:extLst>
-          </p:cNvPr>
-          <p:cNvPicPr>
-            <a:picLocks noChangeAspect="1"/>
-          </p:cNvPicPr>
-          <p:nvPr/>
-        </p:nvPicPr>
-        <p:blipFill>
-          <a:blip r:embed="rId2"/>
-          <a:stretch>
-            <a:fillRect/>
-          </a:stretch>
-        </p:blipFill>
-        <p:spPr>
-          <a:xfrm>
-            <a:off x="2977633" y="958277"/>
-            <a:ext cx="9025681" cy="4493825"/>
-          </a:xfrm>
-          <a:prstGeom prst="rect">
-            <a:avLst/>
-          </a:prstGeom>
-        </p:spPr>
-      </p:pic>
       <p:sp>
         <p:nvSpPr>
           <p:cNvPr id="24" name="Down Arrow 7">
@@ -5655,29 +6089,54 @@
                 <a:ea typeface="+mj-ea"/>
                 <a:cs typeface="+mj-cs"/>
               </a:rPr>
-              <a:t>DevOps</a:t>
-            </a:r>
-            <a:br>
-              <a:rPr lang="en-US" sz="3600" kern="1200" dirty="0">
-                <a:solidFill>
-                  <a:srgbClr val="FFFFFF"/>
-                </a:solidFill>
-                <a:latin typeface="+mj-lt"/>
-                <a:ea typeface="+mj-ea"/>
-                <a:cs typeface="+mj-cs"/>
-              </a:rPr>
-            </a:br>
-            <a:r>
-              <a:rPr lang="en-US" sz="3600" kern="1200" dirty="0">
-                <a:solidFill>
-                  <a:srgbClr val="FFFFFF"/>
-                </a:solidFill>
-                <a:latin typeface="+mj-lt"/>
-                <a:ea typeface="+mj-ea"/>
-                <a:cs typeface="+mj-cs"/>
-              </a:rPr>
-              <a:t>Lifecycle</a:t>
-            </a:r>
+              <a:t>What’s DevOps?</a:t>
+            </a:r>
+          </a:p>
+        </p:txBody>
+      </p:sp>
+      <p:sp>
+        <p:nvSpPr>
+          <p:cNvPr id="3" name="Rectangle 2">
+            <a:extLst>
+              <a:ext uri="{FF2B5EF4-FFF2-40B4-BE49-F238E27FC236}">
+                <a16:creationId xmlns:a16="http://schemas.microsoft.com/office/drawing/2014/main" id="{F79F3174-C140-0248-35F5-C80A867261E7}"/>
+              </a:ext>
+            </a:extLst>
+          </p:cNvPr>
+          <p:cNvSpPr/>
+          <p:nvPr/>
+        </p:nvSpPr>
+        <p:spPr>
+          <a:xfrm>
+            <a:off x="4724400" y="1301258"/>
+            <a:ext cx="6750178" cy="3879272"/>
+          </a:xfrm>
+          <a:prstGeom prst="rect">
+            <a:avLst/>
+          </a:prstGeom>
+        </p:spPr>
+        <p:style>
+          <a:lnRef idx="2">
+            <a:schemeClr val="accent1">
+              <a:shade val="15000"/>
+            </a:schemeClr>
+          </a:lnRef>
+          <a:fillRef idx="1">
+            <a:schemeClr val="accent1"/>
+          </a:fillRef>
+          <a:effectRef idx="0">
+            <a:schemeClr val="accent1"/>
+          </a:effectRef>
+          <a:fontRef idx="minor">
+            <a:schemeClr val="lt1"/>
+          </a:fontRef>
+        </p:style>
+        <p:txBody>
+          <a:bodyPr rtlCol="0" anchor="ctr"/>
+          <a:lstStyle/>
+          <a:p>
+            <a:pPr algn="ctr"/>
+            <a:endParaRPr lang="ru-UA"/>
           </a:p>
         </p:txBody>
       </p:sp>
@@ -5686,7 +6145,7 @@
           <p:cNvPr id="4" name="Footer Placeholder 3">
             <a:extLst>
               <a:ext uri="{FF2B5EF4-FFF2-40B4-BE49-F238E27FC236}">
-                <a16:creationId xmlns:a16="http://schemas.microsoft.com/office/drawing/2014/main" id="{7809B6D4-6BEC-BE7E-34F9-88DA6F881508}"/>
+                <a16:creationId xmlns:a16="http://schemas.microsoft.com/office/drawing/2014/main" id="{ADFF8568-DBE3-6323-E204-CE7FBE7F8761}"/>
               </a:ext>
             </a:extLst>
           </p:cNvPr>
@@ -5713,7 +6172,7 @@
     </p:spTree>
     <p:extLst>
       <p:ext uri="{BB962C8B-B14F-4D97-AF65-F5344CB8AC3E}">
-        <p14:creationId xmlns:p14="http://schemas.microsoft.com/office/powerpoint/2010/main" val="1575064168"/>
+        <p14:creationId xmlns:p14="http://schemas.microsoft.com/office/powerpoint/2010/main" val="1539823432"/>
       </p:ext>
     </p:extLst>
   </p:cSld>
@@ -5748,36 +6207,6 @@
           <a:chExt cx="0" cy="0"/>
         </a:xfrm>
       </p:grpSpPr>
-      <p:pic>
-        <p:nvPicPr>
-          <p:cNvPr id="4" name="Picture 3">
-            <a:extLst>
-              <a:ext uri="{FF2B5EF4-FFF2-40B4-BE49-F238E27FC236}">
-                <a16:creationId xmlns:a16="http://schemas.microsoft.com/office/drawing/2014/main" id="{110B72A2-37FD-3982-5358-333497678F76}"/>
-              </a:ext>
-            </a:extLst>
-          </p:cNvPr>
-          <p:cNvPicPr>
-            <a:picLocks noChangeAspect="1"/>
-          </p:cNvPicPr>
-          <p:nvPr/>
-        </p:nvPicPr>
-        <p:blipFill>
-          <a:blip r:embed="rId2"/>
-          <a:stretch>
-            <a:fillRect/>
-          </a:stretch>
-        </p:blipFill>
-        <p:spPr>
-          <a:xfrm>
-            <a:off x="3967090" y="1392555"/>
-            <a:ext cx="8145780" cy="4072890"/>
-          </a:xfrm>
-          <a:prstGeom prst="rect">
-            <a:avLst/>
-          </a:prstGeom>
-        </p:spPr>
-      </p:pic>
       <p:sp>
         <p:nvSpPr>
           <p:cNvPr id="24" name="Down Arrow 7">
@@ -5862,8 +6291,8 @@
         </p:nvSpPr>
         <p:spPr>
           <a:xfrm>
-            <a:off x="944380" y="1967266"/>
-            <a:ext cx="2713220" cy="2547257"/>
+            <a:off x="1028700" y="1967266"/>
+            <a:ext cx="2628900" cy="2547257"/>
           </a:xfrm>
           <a:noFill/>
         </p:spPr>
@@ -5883,17 +6312,68 @@
                 <a:ea typeface="+mj-ea"/>
                 <a:cs typeface="+mj-cs"/>
               </a:rPr>
-              <a:t>Continuous Development</a:t>
-            </a:r>
-          </a:p>
-        </p:txBody>
-      </p:sp>
+              <a:t>DevOps</a:t>
+            </a:r>
+            <a:br>
+              <a:rPr lang="en-US" sz="3600" kern="1200" dirty="0">
+                <a:solidFill>
+                  <a:srgbClr val="FFFFFF"/>
+                </a:solidFill>
+                <a:latin typeface="+mj-lt"/>
+                <a:ea typeface="+mj-ea"/>
+                <a:cs typeface="+mj-cs"/>
+              </a:rPr>
+            </a:br>
+            <a:r>
+              <a:rPr lang="en-US" sz="3600" kern="1200" dirty="0">
+                <a:solidFill>
+                  <a:srgbClr val="FFFFFF"/>
+                </a:solidFill>
+                <a:latin typeface="+mj-lt"/>
+                <a:ea typeface="+mj-ea"/>
+                <a:cs typeface="+mj-cs"/>
+              </a:rPr>
+              <a:t>Lifecycle</a:t>
+            </a:r>
+          </a:p>
+        </p:txBody>
+      </p:sp>
+      <p:pic>
+        <p:nvPicPr>
+          <p:cNvPr id="4" name="Picture 3">
+            <a:extLst>
+              <a:ext uri="{FF2B5EF4-FFF2-40B4-BE49-F238E27FC236}">
+                <a16:creationId xmlns:a16="http://schemas.microsoft.com/office/drawing/2014/main" id="{385F9644-E8EA-6C22-DF80-DC79BE06769D}"/>
+              </a:ext>
+            </a:extLst>
+          </p:cNvPr>
+          <p:cNvPicPr>
+            <a:picLocks noChangeAspect="1"/>
+          </p:cNvPicPr>
+          <p:nvPr/>
+        </p:nvPicPr>
+        <p:blipFill>
+          <a:blip r:embed="rId2"/>
+          <a:stretch>
+            <a:fillRect/>
+          </a:stretch>
+        </p:blipFill>
+        <p:spPr>
+          <a:xfrm>
+            <a:off x="5548296" y="869148"/>
+            <a:ext cx="5119704" cy="5119704"/>
+          </a:xfrm>
+          <a:prstGeom prst="rect">
+            <a:avLst/>
+          </a:prstGeom>
+        </p:spPr>
+      </p:pic>
       <p:sp>
         <p:nvSpPr>
           <p:cNvPr id="3" name="Footer Placeholder 2">
             <a:extLst>
               <a:ext uri="{FF2B5EF4-FFF2-40B4-BE49-F238E27FC236}">
-                <a16:creationId xmlns:a16="http://schemas.microsoft.com/office/drawing/2014/main" id="{5275B309-6DEC-C514-6561-A419AFA783CF}"/>
+                <a16:creationId xmlns:a16="http://schemas.microsoft.com/office/drawing/2014/main" id="{E6B5C946-F0F9-B52E-3D55-7656B83416CF}"/>
               </a:ext>
             </a:extLst>
           </p:cNvPr>
@@ -5920,7 +6400,7 @@
     </p:spTree>
     <p:extLst>
       <p:ext uri="{BB962C8B-B14F-4D97-AF65-F5344CB8AC3E}">
-        <p14:creationId xmlns:p14="http://schemas.microsoft.com/office/powerpoint/2010/main" val="3278151509"/>
+        <p14:creationId xmlns:p14="http://schemas.microsoft.com/office/powerpoint/2010/main" val="2385514391"/>
       </p:ext>
     </p:extLst>
   </p:cSld>
@@ -5960,7 +6440,7 @@
           <p:cNvPr id="3" name="Picture 2">
             <a:extLst>
               <a:ext uri="{FF2B5EF4-FFF2-40B4-BE49-F238E27FC236}">
-                <a16:creationId xmlns:a16="http://schemas.microsoft.com/office/drawing/2014/main" id="{05A9FF40-DCEC-8E82-7C4D-BDBC1FAB1FDA}"/>
+                <a16:creationId xmlns:a16="http://schemas.microsoft.com/office/drawing/2014/main" id="{15AAA44A-9E89-5E99-D8F5-8E9AA8D7D0DA}"/>
               </a:ext>
             </a:extLst>
           </p:cNvPr>
@@ -5977,8 +6457,8 @@
         </p:blipFill>
         <p:spPr>
           <a:xfrm>
-            <a:off x="2412876" y="974384"/>
-            <a:ext cx="9480311" cy="4455746"/>
+            <a:off x="2977633" y="958277"/>
+            <a:ext cx="9025681" cy="4493825"/>
           </a:xfrm>
           <a:prstGeom prst="rect">
             <a:avLst/>
@@ -6069,8 +6549,8 @@
         </p:nvSpPr>
         <p:spPr>
           <a:xfrm>
-            <a:off x="944380" y="1967266"/>
-            <a:ext cx="2713220" cy="2547257"/>
+            <a:off x="1028700" y="1967266"/>
+            <a:ext cx="2628900" cy="2547257"/>
           </a:xfrm>
           <a:noFill/>
         </p:spPr>
@@ -6090,7 +6570,28 @@
                 <a:ea typeface="+mj-ea"/>
                 <a:cs typeface="+mj-cs"/>
               </a:rPr>
-              <a:t>Continuous Integration</a:t>
+              <a:t>DevOps</a:t>
+            </a:r>
+            <a:br>
+              <a:rPr lang="en-US" sz="3600" kern="1200" dirty="0">
+                <a:solidFill>
+                  <a:srgbClr val="FFFFFF"/>
+                </a:solidFill>
+                <a:latin typeface="+mj-lt"/>
+                <a:ea typeface="+mj-ea"/>
+                <a:cs typeface="+mj-cs"/>
+              </a:rPr>
+            </a:br>
+            <a:r>
+              <a:rPr lang="en-US" sz="3600" kern="1200" dirty="0">
+                <a:solidFill>
+                  <a:srgbClr val="FFFFFF"/>
+                </a:solidFill>
+                <a:latin typeface="+mj-lt"/>
+                <a:ea typeface="+mj-ea"/>
+                <a:cs typeface="+mj-cs"/>
+              </a:rPr>
+              <a:t>Lifecycle</a:t>
             </a:r>
           </a:p>
         </p:txBody>
@@ -6100,7 +6601,7 @@
           <p:cNvPr id="4" name="Footer Placeholder 3">
             <a:extLst>
               <a:ext uri="{FF2B5EF4-FFF2-40B4-BE49-F238E27FC236}">
-                <a16:creationId xmlns:a16="http://schemas.microsoft.com/office/drawing/2014/main" id="{EECB4431-CEA9-CB10-A634-4990102268D3}"/>
+                <a16:creationId xmlns:a16="http://schemas.microsoft.com/office/drawing/2014/main" id="{7809B6D4-6BEC-BE7E-34F9-88DA6F881508}"/>
               </a:ext>
             </a:extLst>
           </p:cNvPr>
@@ -6127,7 +6628,7 @@
     </p:spTree>
     <p:extLst>
       <p:ext uri="{BB962C8B-B14F-4D97-AF65-F5344CB8AC3E}">
-        <p14:creationId xmlns:p14="http://schemas.microsoft.com/office/powerpoint/2010/main" val="3670086471"/>
+        <p14:creationId xmlns:p14="http://schemas.microsoft.com/office/powerpoint/2010/main" val="1575064168"/>
       </p:ext>
     </p:extLst>
   </p:cSld>
@@ -6162,6 +6663,36 @@
           <a:chExt cx="0" cy="0"/>
         </a:xfrm>
       </p:grpSpPr>
+      <p:pic>
+        <p:nvPicPr>
+          <p:cNvPr id="4" name="Picture 3">
+            <a:extLst>
+              <a:ext uri="{FF2B5EF4-FFF2-40B4-BE49-F238E27FC236}">
+                <a16:creationId xmlns:a16="http://schemas.microsoft.com/office/drawing/2014/main" id="{110B72A2-37FD-3982-5358-333497678F76}"/>
+              </a:ext>
+            </a:extLst>
+          </p:cNvPr>
+          <p:cNvPicPr>
+            <a:picLocks noChangeAspect="1"/>
+          </p:cNvPicPr>
+          <p:nvPr/>
+        </p:nvPicPr>
+        <p:blipFill>
+          <a:blip r:embed="rId2"/>
+          <a:stretch>
+            <a:fillRect/>
+          </a:stretch>
+        </p:blipFill>
+        <p:spPr>
+          <a:xfrm>
+            <a:off x="3967090" y="1392555"/>
+            <a:ext cx="8145780" cy="4072890"/>
+          </a:xfrm>
+          <a:prstGeom prst="rect">
+            <a:avLst/>
+          </a:prstGeom>
+        </p:spPr>
+      </p:pic>
       <p:sp>
         <p:nvSpPr>
           <p:cNvPr id="24" name="Down Arrow 7">
@@ -6267,47 +6798,17 @@
                 <a:ea typeface="+mj-ea"/>
                 <a:cs typeface="+mj-cs"/>
               </a:rPr>
-              <a:t>Continuous Testing</a:t>
-            </a:r>
-          </a:p>
-        </p:txBody>
-      </p:sp>
-      <p:pic>
-        <p:nvPicPr>
-          <p:cNvPr id="4" name="Picture 3">
-            <a:extLst>
-              <a:ext uri="{FF2B5EF4-FFF2-40B4-BE49-F238E27FC236}">
-                <a16:creationId xmlns:a16="http://schemas.microsoft.com/office/drawing/2014/main" id="{0A4A47BB-B86E-CE6D-6738-81D9FF41289F}"/>
-              </a:ext>
-            </a:extLst>
-          </p:cNvPr>
-          <p:cNvPicPr>
-            <a:picLocks noChangeAspect="1"/>
-          </p:cNvPicPr>
-          <p:nvPr/>
-        </p:nvPicPr>
-        <p:blipFill>
-          <a:blip r:embed="rId2"/>
-          <a:stretch>
-            <a:fillRect/>
-          </a:stretch>
-        </p:blipFill>
-        <p:spPr>
-          <a:xfrm>
-            <a:off x="4301190" y="1871838"/>
-            <a:ext cx="7890810" cy="2738111"/>
-          </a:xfrm>
-          <a:prstGeom prst="rect">
-            <a:avLst/>
-          </a:prstGeom>
-        </p:spPr>
-      </p:pic>
+              <a:t>Continuous Development</a:t>
+            </a:r>
+          </a:p>
+        </p:txBody>
+      </p:sp>
       <p:sp>
         <p:nvSpPr>
           <p:cNvPr id="3" name="Footer Placeholder 2">
             <a:extLst>
               <a:ext uri="{FF2B5EF4-FFF2-40B4-BE49-F238E27FC236}">
-                <a16:creationId xmlns:a16="http://schemas.microsoft.com/office/drawing/2014/main" id="{80329955-4474-A3E6-6930-05C4CE28FCC4}"/>
+                <a16:creationId xmlns:a16="http://schemas.microsoft.com/office/drawing/2014/main" id="{5275B309-6DEC-C514-6561-A419AFA783CF}"/>
               </a:ext>
             </a:extLst>
           </p:cNvPr>
@@ -6334,7 +6835,7 @@
     </p:spTree>
     <p:extLst>
       <p:ext uri="{BB962C8B-B14F-4D97-AF65-F5344CB8AC3E}">
-        <p14:creationId xmlns:p14="http://schemas.microsoft.com/office/powerpoint/2010/main" val="2476824021"/>
+        <p14:creationId xmlns:p14="http://schemas.microsoft.com/office/powerpoint/2010/main" val="3278151509"/>
       </p:ext>
     </p:extLst>
   </p:cSld>
@@ -6371,10 +6872,10 @@
       </p:grpSpPr>
       <p:pic>
         <p:nvPicPr>
-          <p:cNvPr id="5" name="Picture 4">
-            <a:extLst>
-              <a:ext uri="{FF2B5EF4-FFF2-40B4-BE49-F238E27FC236}">
-                <a16:creationId xmlns:a16="http://schemas.microsoft.com/office/drawing/2014/main" id="{699631DD-6035-BB9F-11EC-4E9F01F1D081}"/>
+          <p:cNvPr id="3" name="Picture 2">
+            <a:extLst>
+              <a:ext uri="{FF2B5EF4-FFF2-40B4-BE49-F238E27FC236}">
+                <a16:creationId xmlns:a16="http://schemas.microsoft.com/office/drawing/2014/main" id="{05A9FF40-DCEC-8E82-7C4D-BDBC1FAB1FDA}"/>
               </a:ext>
             </a:extLst>
           </p:cNvPr>
@@ -6391,38 +6892,8 @@
         </p:blipFill>
         <p:spPr>
           <a:xfrm>
-            <a:off x="3596349" y="3543046"/>
-            <a:ext cx="8447622" cy="1942953"/>
-          </a:xfrm>
-          <a:prstGeom prst="rect">
-            <a:avLst/>
-          </a:prstGeom>
-        </p:spPr>
-      </p:pic>
-      <p:pic>
-        <p:nvPicPr>
-          <p:cNvPr id="3" name="Picture 2">
-            <a:extLst>
-              <a:ext uri="{FF2B5EF4-FFF2-40B4-BE49-F238E27FC236}">
-                <a16:creationId xmlns:a16="http://schemas.microsoft.com/office/drawing/2014/main" id="{438AE1ED-C17A-0BC4-8D21-4B49E9F91B9F}"/>
-              </a:ext>
-            </a:extLst>
-          </p:cNvPr>
-          <p:cNvPicPr>
-            <a:picLocks noChangeAspect="1"/>
-          </p:cNvPicPr>
-          <p:nvPr/>
-        </p:nvPicPr>
-        <p:blipFill>
-          <a:blip r:embed="rId3"/>
-          <a:stretch>
-            <a:fillRect/>
-          </a:stretch>
-        </p:blipFill>
-        <p:spPr>
-          <a:xfrm>
-            <a:off x="3977321" y="1574019"/>
-            <a:ext cx="7996310" cy="1839152"/>
+            <a:off x="2412876" y="974384"/>
+            <a:ext cx="9480311" cy="4455746"/>
           </a:xfrm>
           <a:prstGeom prst="rect">
             <a:avLst/>
@@ -6534,7 +7005,7 @@
                 <a:ea typeface="+mj-ea"/>
                 <a:cs typeface="+mj-cs"/>
               </a:rPr>
-              <a:t>Continuous Deployment/ Continuous Delivery</a:t>
+              <a:t>Continuous Integration</a:t>
             </a:r>
           </a:p>
         </p:txBody>
@@ -6544,7 +7015,7 @@
           <p:cNvPr id="4" name="Footer Placeholder 3">
             <a:extLst>
               <a:ext uri="{FF2B5EF4-FFF2-40B4-BE49-F238E27FC236}">
-                <a16:creationId xmlns:a16="http://schemas.microsoft.com/office/drawing/2014/main" id="{E14FB9CA-46BC-D1B1-5A56-C471B73471E3}"/>
+                <a16:creationId xmlns:a16="http://schemas.microsoft.com/office/drawing/2014/main" id="{EECB4431-CEA9-CB10-A634-4990102268D3}"/>
               </a:ext>
             </a:extLst>
           </p:cNvPr>
@@ -6571,7 +7042,7 @@
     </p:spTree>
     <p:extLst>
       <p:ext uri="{BB962C8B-B14F-4D97-AF65-F5344CB8AC3E}">
-        <p14:creationId xmlns:p14="http://schemas.microsoft.com/office/powerpoint/2010/main" val="303933854"/>
+        <p14:creationId xmlns:p14="http://schemas.microsoft.com/office/powerpoint/2010/main" val="3670086471"/>
       </p:ext>
     </p:extLst>
   </p:cSld>

</xml_diff>